<commit_message>
Changed fig, updated legend with the new method name
</commit_message>
<xml_diff>
--- a/ch07_ragaRecognition/figures/AccuracyVsParameters_tdms.pptx
+++ b/ch07_ragaRecognition/figures/AccuracyVsParameters_tdms.pptx
@@ -243,7 +243,7 @@
           <a:p>
             <a:fld id="{70314E92-832F-AA44-8C06-58770C84545B}" type="datetimeFigureOut">
               <a:rPr lang="en-US" smtClean="0"/>
-              <a:t>9/27/16</a:t>
+              <a:t>10/10/16</a:t>
             </a:fld>
             <a:endParaRPr lang="en-US"/>
           </a:p>
@@ -413,7 +413,7 @@
           <a:p>
             <a:fld id="{70314E92-832F-AA44-8C06-58770C84545B}" type="datetimeFigureOut">
               <a:rPr lang="en-US" smtClean="0"/>
-              <a:t>9/27/16</a:t>
+              <a:t>10/10/16</a:t>
             </a:fld>
             <a:endParaRPr lang="en-US"/>
           </a:p>
@@ -593,7 +593,7 @@
           <a:p>
             <a:fld id="{70314E92-832F-AA44-8C06-58770C84545B}" type="datetimeFigureOut">
               <a:rPr lang="en-US" smtClean="0"/>
-              <a:t>9/27/16</a:t>
+              <a:t>10/10/16</a:t>
             </a:fld>
             <a:endParaRPr lang="en-US"/>
           </a:p>
@@ -763,7 +763,7 @@
           <a:p>
             <a:fld id="{70314E92-832F-AA44-8C06-58770C84545B}" type="datetimeFigureOut">
               <a:rPr lang="en-US" smtClean="0"/>
-              <a:t>9/27/16</a:t>
+              <a:t>10/10/16</a:t>
             </a:fld>
             <a:endParaRPr lang="en-US"/>
           </a:p>
@@ -1009,7 +1009,7 @@
           <a:p>
             <a:fld id="{70314E92-832F-AA44-8C06-58770C84545B}" type="datetimeFigureOut">
               <a:rPr lang="en-US" smtClean="0"/>
-              <a:t>9/27/16</a:t>
+              <a:t>10/10/16</a:t>
             </a:fld>
             <a:endParaRPr lang="en-US"/>
           </a:p>
@@ -1241,7 +1241,7 @@
           <a:p>
             <a:fld id="{70314E92-832F-AA44-8C06-58770C84545B}" type="datetimeFigureOut">
               <a:rPr lang="en-US" smtClean="0"/>
-              <a:t>9/27/16</a:t>
+              <a:t>10/10/16</a:t>
             </a:fld>
             <a:endParaRPr lang="en-US"/>
           </a:p>
@@ -1608,7 +1608,7 @@
           <a:p>
             <a:fld id="{70314E92-832F-AA44-8C06-58770C84545B}" type="datetimeFigureOut">
               <a:rPr lang="en-US" smtClean="0"/>
-              <a:t>9/27/16</a:t>
+              <a:t>10/10/16</a:t>
             </a:fld>
             <a:endParaRPr lang="en-US"/>
           </a:p>
@@ -1726,7 +1726,7 @@
           <a:p>
             <a:fld id="{70314E92-832F-AA44-8C06-58770C84545B}" type="datetimeFigureOut">
               <a:rPr lang="en-US" smtClean="0"/>
-              <a:t>9/27/16</a:t>
+              <a:t>10/10/16</a:t>
             </a:fld>
             <a:endParaRPr lang="en-US"/>
           </a:p>
@@ -1821,7 +1821,7 @@
           <a:p>
             <a:fld id="{70314E92-832F-AA44-8C06-58770C84545B}" type="datetimeFigureOut">
               <a:rPr lang="en-US" smtClean="0"/>
-              <a:t>9/27/16</a:t>
+              <a:t>10/10/16</a:t>
             </a:fld>
             <a:endParaRPr lang="en-US"/>
           </a:p>
@@ -2098,7 +2098,7 @@
           <a:p>
             <a:fld id="{70314E92-832F-AA44-8C06-58770C84545B}" type="datetimeFigureOut">
               <a:rPr lang="en-US" smtClean="0"/>
-              <a:t>9/27/16</a:t>
+              <a:t>10/10/16</a:t>
             </a:fld>
             <a:endParaRPr lang="en-US"/>
           </a:p>
@@ -2351,7 +2351,7 @@
           <a:p>
             <a:fld id="{70314E92-832F-AA44-8C06-58770C84545B}" type="datetimeFigureOut">
               <a:rPr lang="en-US" smtClean="0"/>
-              <a:t>9/27/16</a:t>
+              <a:t>10/10/16</a:t>
             </a:fld>
             <a:endParaRPr lang="en-US"/>
           </a:p>
@@ -2564,7 +2564,7 @@
           <a:p>
             <a:fld id="{70314E92-832F-AA44-8C06-58770C84545B}" type="datetimeFigureOut">
               <a:rPr lang="en-US" smtClean="0"/>
-              <a:t>9/27/16</a:t>
+              <a:t>10/10/16</a:t>
             </a:fld>
             <a:endParaRPr lang="en-US"/>
           </a:p>
@@ -2971,7 +2971,7 @@
       </p:grpSpPr>
       <p:pic>
         <p:nvPicPr>
-          <p:cNvPr id="4" name="Picture 3"/>
+          <p:cNvPr id="2" name="Picture 1"/>
           <p:cNvPicPr>
             <a:picLocks noChangeAspect="1"/>
           </p:cNvPicPr>
@@ -2991,8 +2991,8 @@
         </p:blipFill>
         <p:spPr>
           <a:xfrm>
-            <a:off x="2946400" y="393700"/>
-            <a:ext cx="6286500" cy="6057900"/>
+            <a:off x="3086100" y="368300"/>
+            <a:ext cx="6019800" cy="6108700"/>
           </a:xfrm>
           <a:prstGeom prst="rect">
             <a:avLst/>
@@ -3001,7 +3001,7 @@
       </p:pic>
       <p:pic>
         <p:nvPicPr>
-          <p:cNvPr id="6" name="Picture 5"/>
+          <p:cNvPr id="9" name="Picture 8"/>
           <p:cNvPicPr>
             <a:picLocks noChangeAspect="1"/>
           </p:cNvPicPr>
@@ -3015,76 +3015,12 @@
               </a:ext>
             </a:extLst>
           </a:blip>
-          <a:srcRect l="5381" r="10711" b="5847"/>
-          <a:stretch/>
-        </p:blipFill>
-        <p:spPr>
-          <a:xfrm>
-            <a:off x="4934514" y="420755"/>
-            <a:ext cx="508602" cy="203822"/>
-          </a:xfrm>
-          <a:prstGeom prst="rect">
-            <a:avLst/>
-          </a:prstGeom>
-          <a:solidFill>
-            <a:schemeClr val="bg1"/>
-          </a:solidFill>
-        </p:spPr>
-      </p:pic>
-      <p:pic>
-        <p:nvPicPr>
-          <p:cNvPr id="8" name="Picture 7"/>
-          <p:cNvPicPr>
-            <a:picLocks noChangeAspect="1"/>
-          </p:cNvPicPr>
-          <p:nvPr/>
-        </p:nvPicPr>
-        <p:blipFill rotWithShape="1">
-          <a:blip r:embed="rId3">
-            <a:extLst>
-              <a:ext uri="{28A0092B-C50C-407E-A947-70E740481C1C}">
-                <a14:useLocalDpi xmlns:a14="http://schemas.microsoft.com/office/drawing/2010/main" val="0"/>
-              </a:ext>
-            </a:extLst>
-          </a:blip>
-          <a:srcRect l="5381" r="10711" b="5847"/>
-          <a:stretch/>
-        </p:blipFill>
-        <p:spPr>
-          <a:xfrm>
-            <a:off x="4934514" y="613755"/>
-            <a:ext cx="508602" cy="203822"/>
-          </a:xfrm>
-          <a:prstGeom prst="rect">
-            <a:avLst/>
-          </a:prstGeom>
-          <a:solidFill>
-            <a:schemeClr val="bg1"/>
-          </a:solidFill>
-        </p:spPr>
-      </p:pic>
-      <p:pic>
-        <p:nvPicPr>
-          <p:cNvPr id="9" name="Picture 8"/>
-          <p:cNvPicPr>
-            <a:picLocks noChangeAspect="1"/>
-          </p:cNvPicPr>
-          <p:nvPr/>
-        </p:nvPicPr>
-        <p:blipFill rotWithShape="1">
-          <a:blip r:embed="rId4">
-            <a:extLst>
-              <a:ext uri="{28A0092B-C50C-407E-A947-70E740481C1C}">
-                <a14:useLocalDpi xmlns:a14="http://schemas.microsoft.com/office/drawing/2010/main" val="0"/>
-              </a:ext>
-            </a:extLst>
-          </a:blip>
           <a:srcRect t="1" b="23984"/>
           <a:stretch/>
         </p:blipFill>
         <p:spPr>
           <a:xfrm>
-            <a:off x="8052177" y="444055"/>
+            <a:off x="8147032" y="444055"/>
             <a:ext cx="199647" cy="151761"/>
           </a:xfrm>
           <a:prstGeom prst="rect">
@@ -3104,7 +3040,7 @@
           <p:nvPr/>
         </p:nvPicPr>
         <p:blipFill rotWithShape="1">
-          <a:blip r:embed="rId4">
+          <a:blip r:embed="rId3">
             <a:extLst>
               <a:ext uri="{28A0092B-C50C-407E-A947-70E740481C1C}">
                 <a14:useLocalDpi xmlns:a14="http://schemas.microsoft.com/office/drawing/2010/main" val="0"/>
@@ -3116,7 +3052,7 @@
         </p:blipFill>
         <p:spPr>
           <a:xfrm>
-            <a:off x="8052176" y="639785"/>
+            <a:off x="8147031" y="635991"/>
             <a:ext cx="199647" cy="151761"/>
           </a:xfrm>
           <a:prstGeom prst="rect">

</xml_diff>